<commit_message>
docker and hini prompt added here.
</commit_message>
<xml_diff>
--- a/ppt/docker/2/benefits_docker.pptx
+++ b/ppt/docker/2/benefits_docker.pptx
@@ -467,7 +467,7 @@
           <a:p>
             <a:fld id="{5BCAD085-E8A6-8845-BD4E-CB4CCA059FC4}" type="datetimeFigureOut">
               <a:rPr lang="en-US" smtClean="0"/>
-              <a:t>4/8/2025</a:t>
+              <a:t>4/25/2025</a:t>
             </a:fld>
             <a:endParaRPr lang="en-US"/>
           </a:p>
@@ -791,7 +791,7 @@
           <a:p>
             <a:fld id="{5BCAD085-E8A6-8845-BD4E-CB4CCA059FC4}" type="datetimeFigureOut">
               <a:rPr lang="en-US" smtClean="0"/>
-              <a:t>4/8/2025</a:t>
+              <a:t>4/25/2025</a:t>
             </a:fld>
             <a:endParaRPr lang="en-US"/>
           </a:p>
@@ -1039,7 +1039,7 @@
           <a:p>
             <a:fld id="{5BCAD085-E8A6-8845-BD4E-CB4CCA059FC4}" type="datetimeFigureOut">
               <a:rPr lang="en-US" smtClean="0"/>
-              <a:t>4/8/2025</a:t>
+              <a:t>4/25/2025</a:t>
             </a:fld>
             <a:endParaRPr lang="en-US"/>
           </a:p>
@@ -1378,7 +1378,7 @@
           <a:p>
             <a:fld id="{5BCAD085-E8A6-8845-BD4E-CB4CCA059FC4}" type="datetimeFigureOut">
               <a:rPr lang="en-US" smtClean="0"/>
-              <a:t>4/8/2025</a:t>
+              <a:t>4/25/2025</a:t>
             </a:fld>
             <a:endParaRPr lang="en-US"/>
           </a:p>
@@ -1725,7 +1725,7 @@
           <a:p>
             <a:fld id="{5BCAD085-E8A6-8845-BD4E-CB4CCA059FC4}" type="datetimeFigureOut">
               <a:rPr lang="en-US" smtClean="0"/>
-              <a:t>4/8/2025</a:t>
+              <a:t>4/25/2025</a:t>
             </a:fld>
             <a:endParaRPr lang="en-US"/>
           </a:p>
@@ -2099,7 +2099,7 @@
           <a:p>
             <a:fld id="{5BCAD085-E8A6-8845-BD4E-CB4CCA059FC4}" type="datetimeFigureOut">
               <a:rPr lang="en-US" smtClean="0"/>
-              <a:t>4/8/2025</a:t>
+              <a:t>4/25/2025</a:t>
             </a:fld>
             <a:endParaRPr lang="en-US"/>
           </a:p>
@@ -2569,7 +2569,7 @@
           <a:p>
             <a:fld id="{5BCAD085-E8A6-8845-BD4E-CB4CCA059FC4}" type="datetimeFigureOut">
               <a:rPr lang="en-US" smtClean="0"/>
-              <a:t>4/8/2025</a:t>
+              <a:t>4/25/2025</a:t>
             </a:fld>
             <a:endParaRPr lang="en-US"/>
           </a:p>
@@ -2774,7 +2774,7 @@
           <a:p>
             <a:fld id="{5BCAD085-E8A6-8845-BD4E-CB4CCA059FC4}" type="datetimeFigureOut">
               <a:rPr lang="en-US" smtClean="0"/>
-              <a:t>4/8/2025</a:t>
+              <a:t>4/25/2025</a:t>
             </a:fld>
             <a:endParaRPr lang="en-US"/>
           </a:p>
@@ -2985,7 +2985,7 @@
           <a:p>
             <a:fld id="{5BCAD085-E8A6-8845-BD4E-CB4CCA059FC4}" type="datetimeFigureOut">
               <a:rPr lang="en-US" smtClean="0"/>
-              <a:t>4/8/2025</a:t>
+              <a:t>4/25/2025</a:t>
             </a:fld>
             <a:endParaRPr lang="en-US"/>
           </a:p>
@@ -3217,7 +3217,7 @@
           <a:p>
             <a:fld id="{5BCAD085-E8A6-8845-BD4E-CB4CCA059FC4}" type="datetimeFigureOut">
               <a:rPr lang="en-US" smtClean="0"/>
-              <a:t>4/8/2025</a:t>
+              <a:t>4/25/2025</a:t>
             </a:fld>
             <a:endParaRPr lang="en-US"/>
           </a:p>
@@ -3465,7 +3465,7 @@
           <a:p>
             <a:fld id="{5BCAD085-E8A6-8845-BD4E-CB4CCA059FC4}" type="datetimeFigureOut">
               <a:rPr lang="en-US" smtClean="0"/>
-              <a:t>4/8/2025</a:t>
+              <a:t>4/25/2025</a:t>
             </a:fld>
             <a:endParaRPr lang="en-US"/>
           </a:p>
@@ -3763,7 +3763,7 @@
           <a:p>
             <a:fld id="{5BCAD085-E8A6-8845-BD4E-CB4CCA059FC4}" type="datetimeFigureOut">
               <a:rPr lang="en-US" smtClean="0"/>
-              <a:t>4/8/2025</a:t>
+              <a:t>4/25/2025</a:t>
             </a:fld>
             <a:endParaRPr lang="en-US"/>
           </a:p>
@@ -4157,7 +4157,7 @@
           <a:p>
             <a:fld id="{5BCAD085-E8A6-8845-BD4E-CB4CCA059FC4}" type="datetimeFigureOut">
               <a:rPr lang="en-US" smtClean="0"/>
-              <a:t>4/8/2025</a:t>
+              <a:t>4/25/2025</a:t>
             </a:fld>
             <a:endParaRPr lang="en-US"/>
           </a:p>
@@ -4306,7 +4306,7 @@
           <a:p>
             <a:fld id="{5BCAD085-E8A6-8845-BD4E-CB4CCA059FC4}" type="datetimeFigureOut">
               <a:rPr lang="en-US" smtClean="0"/>
-              <a:t>4/8/2025</a:t>
+              <a:t>4/25/2025</a:t>
             </a:fld>
             <a:endParaRPr lang="en-US"/>
           </a:p>
@@ -4432,7 +4432,7 @@
           <a:p>
             <a:fld id="{5BCAD085-E8A6-8845-BD4E-CB4CCA059FC4}" type="datetimeFigureOut">
               <a:rPr lang="en-US" smtClean="0"/>
-              <a:t>4/8/2025</a:t>
+              <a:t>4/25/2025</a:t>
             </a:fld>
             <a:endParaRPr lang="en-US"/>
           </a:p>
@@ -4687,7 +4687,7 @@
           <a:p>
             <a:fld id="{5BCAD085-E8A6-8845-BD4E-CB4CCA059FC4}" type="datetimeFigureOut">
               <a:rPr lang="en-US" smtClean="0"/>
-              <a:t>4/8/2025</a:t>
+              <a:t>4/25/2025</a:t>
             </a:fld>
             <a:endParaRPr lang="en-US"/>
           </a:p>
@@ -5002,7 +5002,7 @@
           <a:p>
             <a:fld id="{5BCAD085-E8A6-8845-BD4E-CB4CCA059FC4}" type="datetimeFigureOut">
               <a:rPr lang="en-US" smtClean="0"/>
-              <a:t>4/8/2025</a:t>
+              <a:t>4/25/2025</a:t>
             </a:fld>
             <a:endParaRPr lang="en-US"/>
           </a:p>
@@ -5353,7 +5353,7 @@
           <a:p>
             <a:fld id="{5BCAD085-E8A6-8845-BD4E-CB4CCA059FC4}" type="datetimeFigureOut">
               <a:rPr lang="en-US" smtClean="0"/>
-              <a:t>4/8/2025</a:t>
+              <a:t>4/25/2025</a:t>
             </a:fld>
             <a:endParaRPr lang="en-US"/>
           </a:p>
@@ -5919,7 +5919,13 @@
       </p:sp>
       <p:sp>
         <p:nvSpPr>
-          <p:cNvPr id="3" name="Subtitle 2"/>
+          <p:cNvPr id="5" name="Subtitle 4">
+            <a:extLst>
+              <a:ext uri="{FF2B5EF4-FFF2-40B4-BE49-F238E27FC236}">
+                <a16:creationId xmlns:a16="http://schemas.microsoft.com/office/drawing/2014/main" id="{3B660280-9918-D04C-8091-2B7B8784ADA5}"/>
+              </a:ext>
+            </a:extLst>
+          </p:cNvPr>
           <p:cNvSpPr>
             <a:spLocks noGrp="1"/>
           </p:cNvSpPr>
@@ -5932,9 +5938,7 @@
           <a:bodyPr/>
           <a:lstStyle/>
           <a:p>
-            <a:r>
-              <a:t>Auto-generated Presentation</a:t>
-            </a:r>
+            <a:endParaRPr lang="en-US"/>
           </a:p>
         </p:txBody>
       </p:sp>

</xml_diff>